<commit_message>
Update 00 와이어프레임 - 종합 rev 00.pptx
1
</commit_message>
<xml_diff>
--- a/doc/0.공용폴더/05 와이어프레임/00 와이어프레임 - 종합 rev 00.pptx
+++ b/doc/0.공용폴더/05 와이어프레임/00 와이어프레임 - 종합 rev 00.pptx
@@ -325,7 +325,7 @@
             <a:fld id="{85B16BDE-032D-489F-8D20-A88791298AC1}" type="datetimeFigureOut">
               <a:rPr lang="ko-KR" altLang="en-US" smtClean="0"/>
               <a:pPr/>
-              <a:t>2020-06-30</a:t>
+              <a:t>2020-07-01</a:t>
             </a:fld>
             <a:endParaRPr lang="ko-KR" altLang="en-US"/>
           </a:p>
@@ -377,7 +377,7 @@
     </p:spTree>
     <p:extLst>
       <p:ext uri="{BB962C8B-B14F-4D97-AF65-F5344CB8AC3E}">
-        <p14:creationId xmlns="" xmlns:p14="http://schemas.microsoft.com/office/powerpoint/2010/main" val="2118148366"/>
+        <p14:creationId xmlns:p14="http://schemas.microsoft.com/office/powerpoint/2010/main" xmlns="" val="2118148366"/>
       </p:ext>
     </p:extLst>
   </p:cSld>
@@ -497,7 +497,7 @@
             <a:fld id="{85B16BDE-032D-489F-8D20-A88791298AC1}" type="datetimeFigureOut">
               <a:rPr lang="ko-KR" altLang="en-US" smtClean="0"/>
               <a:pPr/>
-              <a:t>2020-06-30</a:t>
+              <a:t>2020-07-01</a:t>
             </a:fld>
             <a:endParaRPr lang="ko-KR" altLang="en-US"/>
           </a:p>
@@ -549,7 +549,7 @@
     </p:spTree>
     <p:extLst>
       <p:ext uri="{BB962C8B-B14F-4D97-AF65-F5344CB8AC3E}">
-        <p14:creationId xmlns="" xmlns:p14="http://schemas.microsoft.com/office/powerpoint/2010/main" val="2967183153"/>
+        <p14:creationId xmlns:p14="http://schemas.microsoft.com/office/powerpoint/2010/main" xmlns="" val="2967183153"/>
       </p:ext>
     </p:extLst>
   </p:cSld>
@@ -679,7 +679,7 @@
             <a:fld id="{85B16BDE-032D-489F-8D20-A88791298AC1}" type="datetimeFigureOut">
               <a:rPr lang="ko-KR" altLang="en-US" smtClean="0"/>
               <a:pPr/>
-              <a:t>2020-06-30</a:t>
+              <a:t>2020-07-01</a:t>
             </a:fld>
             <a:endParaRPr lang="ko-KR" altLang="en-US"/>
           </a:p>
@@ -731,7 +731,7 @@
     </p:spTree>
     <p:extLst>
       <p:ext uri="{BB962C8B-B14F-4D97-AF65-F5344CB8AC3E}">
-        <p14:creationId xmlns="" xmlns:p14="http://schemas.microsoft.com/office/powerpoint/2010/main" val="3139434043"/>
+        <p14:creationId xmlns:p14="http://schemas.microsoft.com/office/powerpoint/2010/main" xmlns="" val="3139434043"/>
       </p:ext>
     </p:extLst>
   </p:cSld>
@@ -851,7 +851,7 @@
             <a:fld id="{85B16BDE-032D-489F-8D20-A88791298AC1}" type="datetimeFigureOut">
               <a:rPr lang="ko-KR" altLang="en-US" smtClean="0"/>
               <a:pPr/>
-              <a:t>2020-06-30</a:t>
+              <a:t>2020-07-01</a:t>
             </a:fld>
             <a:endParaRPr lang="ko-KR" altLang="en-US"/>
           </a:p>
@@ -903,7 +903,7 @@
     </p:spTree>
     <p:extLst>
       <p:ext uri="{BB962C8B-B14F-4D97-AF65-F5344CB8AC3E}">
-        <p14:creationId xmlns="" xmlns:p14="http://schemas.microsoft.com/office/powerpoint/2010/main" val="884517288"/>
+        <p14:creationId xmlns:p14="http://schemas.microsoft.com/office/powerpoint/2010/main" xmlns="" val="884517288"/>
       </p:ext>
     </p:extLst>
   </p:cSld>
@@ -1099,7 +1099,7 @@
             <a:fld id="{85B16BDE-032D-489F-8D20-A88791298AC1}" type="datetimeFigureOut">
               <a:rPr lang="ko-KR" altLang="en-US" smtClean="0"/>
               <a:pPr/>
-              <a:t>2020-06-30</a:t>
+              <a:t>2020-07-01</a:t>
             </a:fld>
             <a:endParaRPr lang="ko-KR" altLang="en-US"/>
           </a:p>
@@ -1151,7 +1151,7 @@
     </p:spTree>
     <p:extLst>
       <p:ext uri="{BB962C8B-B14F-4D97-AF65-F5344CB8AC3E}">
-        <p14:creationId xmlns="" xmlns:p14="http://schemas.microsoft.com/office/powerpoint/2010/main" val="2742713806"/>
+        <p14:creationId xmlns:p14="http://schemas.microsoft.com/office/powerpoint/2010/main" xmlns="" val="2742713806"/>
       </p:ext>
     </p:extLst>
   </p:cSld>
@@ -1389,7 +1389,7 @@
             <a:fld id="{85B16BDE-032D-489F-8D20-A88791298AC1}" type="datetimeFigureOut">
               <a:rPr lang="ko-KR" altLang="en-US" smtClean="0"/>
               <a:pPr/>
-              <a:t>2020-06-30</a:t>
+              <a:t>2020-07-01</a:t>
             </a:fld>
             <a:endParaRPr lang="ko-KR" altLang="en-US"/>
           </a:p>
@@ -1441,7 +1441,7 @@
     </p:spTree>
     <p:extLst>
       <p:ext uri="{BB962C8B-B14F-4D97-AF65-F5344CB8AC3E}">
-        <p14:creationId xmlns="" xmlns:p14="http://schemas.microsoft.com/office/powerpoint/2010/main" val="4228873110"/>
+        <p14:creationId xmlns:p14="http://schemas.microsoft.com/office/powerpoint/2010/main" xmlns="" val="4228873110"/>
       </p:ext>
     </p:extLst>
   </p:cSld>
@@ -1813,7 +1813,7 @@
             <a:fld id="{85B16BDE-032D-489F-8D20-A88791298AC1}" type="datetimeFigureOut">
               <a:rPr lang="ko-KR" altLang="en-US" smtClean="0"/>
               <a:pPr/>
-              <a:t>2020-06-30</a:t>
+              <a:t>2020-07-01</a:t>
             </a:fld>
             <a:endParaRPr lang="ko-KR" altLang="en-US"/>
           </a:p>
@@ -1865,7 +1865,7 @@
     </p:spTree>
     <p:extLst>
       <p:ext uri="{BB962C8B-B14F-4D97-AF65-F5344CB8AC3E}">
-        <p14:creationId xmlns="" xmlns:p14="http://schemas.microsoft.com/office/powerpoint/2010/main" val="603847611"/>
+        <p14:creationId xmlns:p14="http://schemas.microsoft.com/office/powerpoint/2010/main" xmlns="" val="603847611"/>
       </p:ext>
     </p:extLst>
   </p:cSld>
@@ -1933,7 +1933,7 @@
             <a:fld id="{85B16BDE-032D-489F-8D20-A88791298AC1}" type="datetimeFigureOut">
               <a:rPr lang="ko-KR" altLang="en-US" smtClean="0"/>
               <a:pPr/>
-              <a:t>2020-06-30</a:t>
+              <a:t>2020-07-01</a:t>
             </a:fld>
             <a:endParaRPr lang="ko-KR" altLang="en-US"/>
           </a:p>
@@ -1985,7 +1985,7 @@
     </p:spTree>
     <p:extLst>
       <p:ext uri="{BB962C8B-B14F-4D97-AF65-F5344CB8AC3E}">
-        <p14:creationId xmlns="" xmlns:p14="http://schemas.microsoft.com/office/powerpoint/2010/main" val="2005364396"/>
+        <p14:creationId xmlns:p14="http://schemas.microsoft.com/office/powerpoint/2010/main" xmlns="" val="2005364396"/>
       </p:ext>
     </p:extLst>
   </p:cSld>
@@ -2030,7 +2030,7 @@
             <a:fld id="{85B16BDE-032D-489F-8D20-A88791298AC1}" type="datetimeFigureOut">
               <a:rPr lang="ko-KR" altLang="en-US" smtClean="0"/>
               <a:pPr/>
-              <a:t>2020-06-30</a:t>
+              <a:t>2020-07-01</a:t>
             </a:fld>
             <a:endParaRPr lang="ko-KR" altLang="en-US"/>
           </a:p>
@@ -2082,7 +2082,7 @@
     </p:spTree>
     <p:extLst>
       <p:ext uri="{BB962C8B-B14F-4D97-AF65-F5344CB8AC3E}">
-        <p14:creationId xmlns="" xmlns:p14="http://schemas.microsoft.com/office/powerpoint/2010/main" val="1259732851"/>
+        <p14:creationId xmlns:p14="http://schemas.microsoft.com/office/powerpoint/2010/main" xmlns="" val="1259732851"/>
       </p:ext>
     </p:extLst>
   </p:cSld>
@@ -2309,7 +2309,7 @@
             <a:fld id="{85B16BDE-032D-489F-8D20-A88791298AC1}" type="datetimeFigureOut">
               <a:rPr lang="ko-KR" altLang="en-US" smtClean="0"/>
               <a:pPr/>
-              <a:t>2020-06-30</a:t>
+              <a:t>2020-07-01</a:t>
             </a:fld>
             <a:endParaRPr lang="ko-KR" altLang="en-US"/>
           </a:p>
@@ -2361,7 +2361,7 @@
     </p:spTree>
     <p:extLst>
       <p:ext uri="{BB962C8B-B14F-4D97-AF65-F5344CB8AC3E}">
-        <p14:creationId xmlns="" xmlns:p14="http://schemas.microsoft.com/office/powerpoint/2010/main" val="933014393"/>
+        <p14:creationId xmlns:p14="http://schemas.microsoft.com/office/powerpoint/2010/main" xmlns="" val="933014393"/>
       </p:ext>
     </p:extLst>
   </p:cSld>
@@ -2564,7 +2564,7 @@
             <a:fld id="{85B16BDE-032D-489F-8D20-A88791298AC1}" type="datetimeFigureOut">
               <a:rPr lang="ko-KR" altLang="en-US" smtClean="0"/>
               <a:pPr/>
-              <a:t>2020-06-30</a:t>
+              <a:t>2020-07-01</a:t>
             </a:fld>
             <a:endParaRPr lang="ko-KR" altLang="en-US"/>
           </a:p>
@@ -2616,7 +2616,7 @@
     </p:spTree>
     <p:extLst>
       <p:ext uri="{BB962C8B-B14F-4D97-AF65-F5344CB8AC3E}">
-        <p14:creationId xmlns="" xmlns:p14="http://schemas.microsoft.com/office/powerpoint/2010/main" val="2509312667"/>
+        <p14:creationId xmlns:p14="http://schemas.microsoft.com/office/powerpoint/2010/main" xmlns="" val="2509312667"/>
       </p:ext>
     </p:extLst>
   </p:cSld>
@@ -2779,7 +2779,7 @@
             <a:fld id="{85B16BDE-032D-489F-8D20-A88791298AC1}" type="datetimeFigureOut">
               <a:rPr lang="ko-KR" altLang="en-US" smtClean="0"/>
               <a:pPr/>
-              <a:t>2020-06-30</a:t>
+              <a:t>2020-07-01</a:t>
             </a:fld>
             <a:endParaRPr lang="ko-KR" altLang="en-US"/>
           </a:p>
@@ -2867,7 +2867,7 @@
     </p:spTree>
     <p:extLst>
       <p:ext uri="{BB962C8B-B14F-4D97-AF65-F5344CB8AC3E}">
-        <p14:creationId xmlns="" xmlns:p14="http://schemas.microsoft.com/office/powerpoint/2010/main" val="2062571708"/>
+        <p14:creationId xmlns:p14="http://schemas.microsoft.com/office/powerpoint/2010/main" xmlns="" val="2062571708"/>
       </p:ext>
     </p:extLst>
   </p:cSld>
@@ -3202,10 +3202,10 @@
           <p:nvPr/>
         </p:nvPicPr>
         <p:blipFill>
-          <a:blip r:embed="rId2">
+          <a:blip r:embed="rId2" cstate="print">
             <a:extLst>
               <a:ext uri="{28A0092B-C50C-407E-A947-70E740481C1C}">
-                <a14:useLocalDpi xmlns="" xmlns:a14="http://schemas.microsoft.com/office/drawing/2010/main" val="0"/>
+                <a14:useLocalDpi xmlns:a14="http://schemas.microsoft.com/office/drawing/2010/main" xmlns="" val="0"/>
               </a:ext>
             </a:extLst>
           </a:blip>
@@ -3229,14 +3229,14 @@
           <a:effectLst/>
           <a:extLst>
             <a:ext uri="{909E8E84-426E-40DD-AFC4-6F175D3DCCD1}">
-              <a14:hiddenFill xmlns="" xmlns:a14="http://schemas.microsoft.com/office/drawing/2010/main">
+              <a14:hiddenFill xmlns:a14="http://schemas.microsoft.com/office/drawing/2010/main" xmlns="">
                 <a:solidFill>
                   <a:schemeClr val="accent1"/>
                 </a:solidFill>
               </a14:hiddenFill>
             </a:ext>
             <a:ext uri="{91240B29-F687-4F45-9708-019B960494DF}">
-              <a14:hiddenLine xmlns="" xmlns:a14="http://schemas.microsoft.com/office/drawing/2010/main" w="9525">
+              <a14:hiddenLine xmlns:a14="http://schemas.microsoft.com/office/drawing/2010/main" xmlns="" w="9525">
                 <a:solidFill>
                   <a:schemeClr val="tx1"/>
                 </a:solidFill>
@@ -3246,7 +3246,7 @@
               </a14:hiddenLine>
             </a:ext>
             <a:ext uri="{AF507438-7753-43E0-B8FC-AC1667EBCBE1}">
-              <a14:hiddenEffects xmlns="" xmlns:a14="http://schemas.microsoft.com/office/drawing/2010/main">
+              <a14:hiddenEffects xmlns:a14="http://schemas.microsoft.com/office/drawing/2010/main" xmlns="">
                 <a:effectLst>
                   <a:outerShdw dist="35921" dir="2700000" algn="ctr" rotWithShape="0">
                     <a:schemeClr val="bg2"/>
@@ -3354,7 +3354,7 @@
     </p:spTree>
     <p:extLst>
       <p:ext uri="{BB962C8B-B14F-4D97-AF65-F5344CB8AC3E}">
-        <p14:creationId xmlns="" xmlns:p14="http://schemas.microsoft.com/office/powerpoint/2010/main" val="3322499010"/>
+        <p14:creationId xmlns:p14="http://schemas.microsoft.com/office/powerpoint/2010/main" xmlns="" val="3322499010"/>
       </p:ext>
     </p:extLst>
   </p:cSld>
@@ -3383,20 +3383,14 @@
       </p:grpSpPr>
       <p:pic>
         <p:nvPicPr>
-          <p:cNvPr id="2" name="Picture 4" descr="E:\2차 프로젝트(구로구 기러기)\04 wire frame\와이어프레임 - 경기일정 게시판(박종수)\경기일정 게시판 - 상세보기.PNG"/>
+          <p:cNvPr id="5122" name="Picture 2" descr="C:\Users\hong\Desktop\mediQ\ggs\doc\1.개인폴더\최현우\99. 참고\수정본\경기 일정 상세.PNG"/>
           <p:cNvPicPr>
             <a:picLocks noChangeAspect="1" noChangeArrowheads="1"/>
           </p:cNvPicPr>
           <p:nvPr/>
         </p:nvPicPr>
         <p:blipFill>
-          <a:blip r:embed="rId2">
-            <a:extLst>
-              <a:ext uri="{28A0092B-C50C-407E-A947-70E740481C1C}">
-                <a14:useLocalDpi xmlns="" xmlns:a14="http://schemas.microsoft.com/office/drawing/2010/main" val="0"/>
-              </a:ext>
-            </a:extLst>
-          </a:blip>
+          <a:blip r:embed="rId2" cstate="print"/>
           <a:srcRect/>
           <a:stretch>
             <a:fillRect/>
@@ -3404,28 +3398,19 @@
         </p:blipFill>
         <p:spPr bwMode="auto">
           <a:xfrm>
-            <a:off x="1547664" y="188640"/>
-            <a:ext cx="6218438" cy="6480000"/>
+            <a:off x="1979712" y="188640"/>
+            <a:ext cx="6192688" cy="6444423"/>
           </a:xfrm>
           <a:prstGeom prst="rect">
             <a:avLst/>
           </a:prstGeom>
           <a:noFill/>
-          <a:extLst>
-            <a:ext uri="{909E8E84-426E-40DD-AFC4-6F175D3DCCD1}">
-              <a14:hiddenFill xmlns="" xmlns:a14="http://schemas.microsoft.com/office/drawing/2010/main">
-                <a:solidFill>
-                  <a:srgbClr val="FFFFFF"/>
-                </a:solidFill>
-              </a14:hiddenFill>
-            </a:ext>
-          </a:extLst>
         </p:spPr>
       </p:pic>
     </p:spTree>
     <p:extLst>
       <p:ext uri="{BB962C8B-B14F-4D97-AF65-F5344CB8AC3E}">
-        <p14:creationId xmlns="" xmlns:p14="http://schemas.microsoft.com/office/powerpoint/2010/main" val="1522577095"/>
+        <p14:creationId xmlns:p14="http://schemas.microsoft.com/office/powerpoint/2010/main" xmlns="" val="1522577095"/>
       </p:ext>
     </p:extLst>
   </p:cSld>
@@ -3461,20 +3446,14 @@
       </p:grpSpPr>
       <p:pic>
         <p:nvPicPr>
-          <p:cNvPr id="2" name="Picture 7" descr="E:\2차 프로젝트(구로구 기러기)\04 wire frame\와이어프레임 - 경기일정 게시판(박종수)\승부 예측.PNG"/>
+          <p:cNvPr id="4098" name="Picture 2" descr="C:\Users\hong\Desktop\mediQ\ggs\doc\1.개인폴더\최현우\99. 참고\수정본\경기 예측 수정본.PNG"/>
           <p:cNvPicPr>
             <a:picLocks noChangeAspect="1" noChangeArrowheads="1"/>
           </p:cNvPicPr>
           <p:nvPr/>
         </p:nvPicPr>
         <p:blipFill>
-          <a:blip r:embed="rId2">
-            <a:extLst>
-              <a:ext uri="{28A0092B-C50C-407E-A947-70E740481C1C}">
-                <a14:useLocalDpi xmlns="" xmlns:a14="http://schemas.microsoft.com/office/drawing/2010/main" val="0"/>
-              </a:ext>
-            </a:extLst>
-          </a:blip>
+          <a:blip r:embed="rId2" cstate="print"/>
           <a:srcRect/>
           <a:stretch>
             <a:fillRect/>
@@ -3482,28 +3461,19 @@
         </p:blipFill>
         <p:spPr bwMode="auto">
           <a:xfrm>
-            <a:off x="1244315" y="188640"/>
-            <a:ext cx="6325917" cy="6480000"/>
+            <a:off x="755576" y="269576"/>
+            <a:ext cx="6984776" cy="6394898"/>
           </a:xfrm>
           <a:prstGeom prst="rect">
             <a:avLst/>
           </a:prstGeom>
           <a:noFill/>
-          <a:extLst>
-            <a:ext uri="{909E8E84-426E-40DD-AFC4-6F175D3DCCD1}">
-              <a14:hiddenFill xmlns="" xmlns:a14="http://schemas.microsoft.com/office/drawing/2010/main">
-                <a:solidFill>
-                  <a:srgbClr val="FFFFFF"/>
-                </a:solidFill>
-              </a14:hiddenFill>
-            </a:ext>
-          </a:extLst>
         </p:spPr>
       </p:pic>
     </p:spTree>
     <p:extLst>
       <p:ext uri="{BB962C8B-B14F-4D97-AF65-F5344CB8AC3E}">
-        <p14:creationId xmlns="" xmlns:p14="http://schemas.microsoft.com/office/powerpoint/2010/main" val="1522577095"/>
+        <p14:creationId xmlns:p14="http://schemas.microsoft.com/office/powerpoint/2010/main" xmlns="" val="1522577095"/>
       </p:ext>
     </p:extLst>
   </p:cSld>
@@ -3539,20 +3509,14 @@
       </p:grpSpPr>
       <p:pic>
         <p:nvPicPr>
-          <p:cNvPr id="2" name="Picture 6" descr="E:\2차 프로젝트(구로구 기러기)\04 wire frame\와이어프레임 - 경기일정 게시판(박종수)\승부 예측 상세.PNG"/>
+          <p:cNvPr id="3074" name="Picture 2" descr="C:\Users\hong\Desktop\mediQ\ggs\doc\1.개인폴더\최현우\99. 참고\수정본\경기 예측 상세.PNG"/>
           <p:cNvPicPr>
             <a:picLocks noChangeAspect="1" noChangeArrowheads="1"/>
           </p:cNvPicPr>
           <p:nvPr/>
         </p:nvPicPr>
         <p:blipFill>
-          <a:blip r:embed="rId2">
-            <a:extLst>
-              <a:ext uri="{28A0092B-C50C-407E-A947-70E740481C1C}">
-                <a14:useLocalDpi xmlns="" xmlns:a14="http://schemas.microsoft.com/office/drawing/2010/main" val="0"/>
-              </a:ext>
-            </a:extLst>
-          </a:blip>
+          <a:blip r:embed="rId2" cstate="print"/>
           <a:srcRect/>
           <a:stretch>
             <a:fillRect/>
@@ -3560,28 +3524,19 @@
         </p:blipFill>
         <p:spPr bwMode="auto">
           <a:xfrm>
-            <a:off x="1691680" y="233881"/>
-            <a:ext cx="5319646" cy="6480000"/>
+            <a:off x="2051720" y="131107"/>
+            <a:ext cx="5400600" cy="6726893"/>
           </a:xfrm>
           <a:prstGeom prst="rect">
             <a:avLst/>
           </a:prstGeom>
           <a:noFill/>
-          <a:extLst>
-            <a:ext uri="{909E8E84-426E-40DD-AFC4-6F175D3DCCD1}">
-              <a14:hiddenFill xmlns="" xmlns:a14="http://schemas.microsoft.com/office/drawing/2010/main">
-                <a:solidFill>
-                  <a:srgbClr val="FFFFFF"/>
-                </a:solidFill>
-              </a14:hiddenFill>
-            </a:ext>
-          </a:extLst>
         </p:spPr>
       </p:pic>
     </p:spTree>
     <p:extLst>
       <p:ext uri="{BB962C8B-B14F-4D97-AF65-F5344CB8AC3E}">
-        <p14:creationId xmlns="" xmlns:p14="http://schemas.microsoft.com/office/powerpoint/2010/main" val="1522577095"/>
+        <p14:creationId xmlns:p14="http://schemas.microsoft.com/office/powerpoint/2010/main" xmlns="" val="1522577095"/>
       </p:ext>
     </p:extLst>
   </p:cSld>
@@ -3617,20 +3572,14 @@
       </p:grpSpPr>
       <p:pic>
         <p:nvPicPr>
-          <p:cNvPr id="2" name="Picture 3" descr="E:\2차 프로젝트(구로구 기러기)\04 wire frame\와이어프레임 - 경기일정 게시판(박종수)\경기결과 게시판.PNG"/>
+          <p:cNvPr id="2050" name="Picture 2" descr="C:\Users\hong\Desktop\mediQ\ggs\doc\1.개인폴더\최현우\99. 참고\수정본\경기 결과 수정본.PNG"/>
           <p:cNvPicPr>
             <a:picLocks noChangeAspect="1" noChangeArrowheads="1"/>
           </p:cNvPicPr>
           <p:nvPr/>
         </p:nvPicPr>
         <p:blipFill>
-          <a:blip r:embed="rId2">
-            <a:extLst>
-              <a:ext uri="{28A0092B-C50C-407E-A947-70E740481C1C}">
-                <a14:useLocalDpi xmlns="" xmlns:a14="http://schemas.microsoft.com/office/drawing/2010/main" val="0"/>
-              </a:ext>
-            </a:extLst>
-          </a:blip>
+          <a:blip r:embed="rId2" cstate="print"/>
           <a:srcRect/>
           <a:stretch>
             <a:fillRect/>
@@ -3638,28 +3587,19 @@
         </p:blipFill>
         <p:spPr bwMode="auto">
           <a:xfrm>
-            <a:off x="74992" y="460355"/>
-            <a:ext cx="9000000" cy="6327319"/>
+            <a:off x="251519" y="332656"/>
+            <a:ext cx="8681945" cy="6214070"/>
           </a:xfrm>
           <a:prstGeom prst="rect">
             <a:avLst/>
           </a:prstGeom>
           <a:noFill/>
-          <a:extLst>
-            <a:ext uri="{909E8E84-426E-40DD-AFC4-6F175D3DCCD1}">
-              <a14:hiddenFill xmlns="" xmlns:a14="http://schemas.microsoft.com/office/drawing/2010/main">
-                <a:solidFill>
-                  <a:srgbClr val="FFFFFF"/>
-                </a:solidFill>
-              </a14:hiddenFill>
-            </a:ext>
-          </a:extLst>
         </p:spPr>
       </p:pic>
     </p:spTree>
     <p:extLst>
       <p:ext uri="{BB962C8B-B14F-4D97-AF65-F5344CB8AC3E}">
-        <p14:creationId xmlns="" xmlns:p14="http://schemas.microsoft.com/office/powerpoint/2010/main" val="1522577095"/>
+        <p14:creationId xmlns:p14="http://schemas.microsoft.com/office/powerpoint/2010/main" xmlns="" val="1522577095"/>
       </p:ext>
     </p:extLst>
   </p:cSld>
@@ -3695,20 +3635,14 @@
       </p:grpSpPr>
       <p:pic>
         <p:nvPicPr>
-          <p:cNvPr id="1026" name="Picture 2" descr="E:\2차 프로젝트(구로구 기러기)\04 wire frame\와이어프레임 - 경기일정 게시판(박종수)\경기결과 게시판 상세.PNG"/>
+          <p:cNvPr id="1027" name="Picture 3" descr="C:\Users\hong\Desktop\mediQ\ggs\doc\1.개인폴더\최현우\99. 참고\수정본\경기 결과 상세 수정본.PNG"/>
           <p:cNvPicPr>
             <a:picLocks noChangeAspect="1" noChangeArrowheads="1"/>
           </p:cNvPicPr>
           <p:nvPr/>
         </p:nvPicPr>
         <p:blipFill>
-          <a:blip r:embed="rId2">
-            <a:extLst>
-              <a:ext uri="{28A0092B-C50C-407E-A947-70E740481C1C}">
-                <a14:useLocalDpi xmlns="" xmlns:a14="http://schemas.microsoft.com/office/drawing/2010/main" val="0"/>
-              </a:ext>
-            </a:extLst>
-          </a:blip>
+          <a:blip r:embed="rId2" cstate="print"/>
           <a:srcRect/>
           <a:stretch>
             <a:fillRect/>
@@ -3716,73 +3650,19 @@
         </p:blipFill>
         <p:spPr bwMode="auto">
           <a:xfrm>
-            <a:off x="2267744" y="188640"/>
-            <a:ext cx="4355850" cy="6480000"/>
+            <a:off x="2195736" y="1"/>
+            <a:ext cx="4724400" cy="6857999"/>
           </a:xfrm>
           <a:prstGeom prst="rect">
             <a:avLst/>
           </a:prstGeom>
           <a:noFill/>
-          <a:extLst>
-            <a:ext uri="{909E8E84-426E-40DD-AFC4-6F175D3DCCD1}">
-              <a14:hiddenFill xmlns="" xmlns:a14="http://schemas.microsoft.com/office/drawing/2010/main">
-                <a:solidFill>
-                  <a:srgbClr val="FFFFFF"/>
-                </a:solidFill>
-              </a14:hiddenFill>
-            </a:ext>
-          </a:extLst>
         </p:spPr>
       </p:pic>
-      <p:sp>
-        <p:nvSpPr>
-          <p:cNvPr id="3" name="TextBox 2"/>
-          <p:cNvSpPr txBox="1"/>
-          <p:nvPr/>
-        </p:nvSpPr>
-        <p:spPr>
-          <a:xfrm>
-            <a:off x="6516216" y="4581128"/>
-            <a:ext cx="2448272" cy="246221"/>
-          </a:xfrm>
-          <a:prstGeom prst="rect">
-            <a:avLst/>
-          </a:prstGeom>
-          <a:solidFill>
-            <a:schemeClr val="bg1"/>
-          </a:solidFill>
-          <a:ln>
-            <a:solidFill>
-              <a:schemeClr val="tx1"/>
-            </a:solidFill>
-          </a:ln>
-        </p:spPr>
-        <p:txBody>
-          <a:bodyPr wrap="square" rtlCol="0">
-            <a:spAutoFit/>
-          </a:bodyPr>
-          <a:lstStyle/>
-          <a:p>
-            <a:r>
-              <a:rPr lang="ko-KR" altLang="en-US" sz="1000" b="1" dirty="0" smtClean="0">
-                <a:solidFill>
-                  <a:srgbClr val="FF0000"/>
-                </a:solidFill>
-              </a:rPr>
-              <a:t>예측 결과 추가</a:t>
-            </a:r>
-            <a:endParaRPr lang="ko-KR" altLang="en-US" sz="1000" b="1" dirty="0">
-              <a:solidFill>
-                <a:srgbClr val="FF0000"/>
-              </a:solidFill>
-            </a:endParaRPr>
-          </a:p>
-        </p:txBody>
-      </p:sp>
     </p:spTree>
     <p:extLst>
       <p:ext uri="{BB962C8B-B14F-4D97-AF65-F5344CB8AC3E}">
-        <p14:creationId xmlns="" xmlns:p14="http://schemas.microsoft.com/office/powerpoint/2010/main" val="2234334166"/>
+        <p14:creationId xmlns:p14="http://schemas.microsoft.com/office/powerpoint/2010/main" xmlns="" val="2234334166"/>
       </p:ext>
     </p:extLst>
   </p:cSld>
@@ -3825,7 +3705,7 @@
           <p:nvPr/>
         </p:nvPicPr>
         <p:blipFill>
-          <a:blip r:embed="rId2"/>
+          <a:blip r:embed="rId2" cstate="print"/>
           <a:srcRect/>
           <a:stretch>
             <a:fillRect/>
@@ -3852,7 +3732,7 @@
     </p:spTree>
     <p:extLst>
       <p:ext uri="{BB962C8B-B14F-4D97-AF65-F5344CB8AC3E}">
-        <p14:creationId xmlns="" xmlns:p14="http://schemas.microsoft.com/office/powerpoint/2010/main" val="1245314589"/>
+        <p14:creationId xmlns:p14="http://schemas.microsoft.com/office/powerpoint/2010/main" xmlns="" val="1245314589"/>
       </p:ext>
     </p:extLst>
   </p:cSld>
@@ -3888,7 +3768,7 @@
           <p:nvPr/>
         </p:nvPicPr>
         <p:blipFill>
-          <a:blip r:embed="rId2"/>
+          <a:blip r:embed="rId2" cstate="print"/>
           <a:srcRect/>
           <a:stretch>
             <a:fillRect/>
@@ -3915,7 +3795,7 @@
     </p:spTree>
     <p:extLst>
       <p:ext uri="{BB962C8B-B14F-4D97-AF65-F5344CB8AC3E}">
-        <p14:creationId xmlns="" xmlns:p14="http://schemas.microsoft.com/office/powerpoint/2010/main" val="2206801969"/>
+        <p14:creationId xmlns:p14="http://schemas.microsoft.com/office/powerpoint/2010/main" xmlns="" val="2206801969"/>
       </p:ext>
     </p:extLst>
   </p:cSld>
@@ -3951,7 +3831,7 @@
           <p:nvPr/>
         </p:nvPicPr>
         <p:blipFill>
-          <a:blip r:embed="rId2"/>
+          <a:blip r:embed="rId2" cstate="print"/>
           <a:srcRect/>
           <a:stretch>
             <a:fillRect/>
@@ -3978,7 +3858,7 @@
     </p:spTree>
     <p:extLst>
       <p:ext uri="{BB962C8B-B14F-4D97-AF65-F5344CB8AC3E}">
-        <p14:creationId xmlns="" xmlns:p14="http://schemas.microsoft.com/office/powerpoint/2010/main" val="713391932"/>
+        <p14:creationId xmlns:p14="http://schemas.microsoft.com/office/powerpoint/2010/main" xmlns="" val="713391932"/>
       </p:ext>
     </p:extLst>
   </p:cSld>
@@ -4014,7 +3894,7 @@
           <p:nvPr/>
         </p:nvPicPr>
         <p:blipFill>
-          <a:blip r:embed="rId2"/>
+          <a:blip r:embed="rId2" cstate="print"/>
           <a:srcRect/>
           <a:stretch>
             <a:fillRect/>
@@ -4041,7 +3921,7 @@
     </p:spTree>
     <p:extLst>
       <p:ext uri="{BB962C8B-B14F-4D97-AF65-F5344CB8AC3E}">
-        <p14:creationId xmlns="" xmlns:p14="http://schemas.microsoft.com/office/powerpoint/2010/main" val="2573928863"/>
+        <p14:creationId xmlns:p14="http://schemas.microsoft.com/office/powerpoint/2010/main" xmlns="" val="2573928863"/>
       </p:ext>
     </p:extLst>
   </p:cSld>
@@ -4119,7 +3999,7 @@
                 <p:nvPr/>
               </p:nvPicPr>
               <p:blipFill>
-                <a:blip r:embed="rId2"/>
+                <a:blip r:embed="rId2" cstate="print"/>
                 <a:srcRect/>
                 <a:stretch>
                   <a:fillRect/>
@@ -4202,7 +4082,7 @@
               <a:blip r:embed="rId3" cstate="print">
                 <a:extLst>
                   <a:ext uri="{28A0092B-C50C-407E-A947-70E740481C1C}">
-                    <a14:useLocalDpi xmlns="" xmlns:a14="http://schemas.microsoft.com/office/drawing/2010/main" val="0"/>
+                    <a14:useLocalDpi xmlns:a14="http://schemas.microsoft.com/office/drawing/2010/main" xmlns="" val="0"/>
                   </a:ext>
                 </a:extLst>
               </a:blip>
@@ -4231,14 +4111,14 @@
               <a:effectLst/>
               <a:extLst>
                 <a:ext uri="{909E8E84-426E-40DD-AFC4-6F175D3DCCD1}">
-                  <a14:hiddenFill xmlns="" xmlns:a14="http://schemas.microsoft.com/office/drawing/2010/main">
+                  <a14:hiddenFill xmlns:a14="http://schemas.microsoft.com/office/drawing/2010/main" xmlns="">
                     <a:solidFill>
                       <a:schemeClr val="accent1"/>
                     </a:solidFill>
                   </a14:hiddenFill>
                 </a:ext>
                 <a:ext uri="{AF507438-7753-43E0-B8FC-AC1667EBCBE1}">
-                  <a14:hiddenEffects xmlns="" xmlns:a14="http://schemas.microsoft.com/office/drawing/2010/main">
+                  <a14:hiddenEffects xmlns:a14="http://schemas.microsoft.com/office/drawing/2010/main" xmlns="">
                     <a:effectLst>
                       <a:outerShdw dist="35921" dir="2700000" algn="ctr" rotWithShape="0">
                         <a:schemeClr val="bg2"/>
@@ -4261,7 +4141,7 @@
               <a:blip r:embed="rId4" cstate="print">
                 <a:extLst>
                   <a:ext uri="{28A0092B-C50C-407E-A947-70E740481C1C}">
-                    <a14:useLocalDpi xmlns="" xmlns:a14="http://schemas.microsoft.com/office/drawing/2010/main" val="0"/>
+                    <a14:useLocalDpi xmlns:a14="http://schemas.microsoft.com/office/drawing/2010/main" xmlns="" val="0"/>
                   </a:ext>
                 </a:extLst>
               </a:blip>
@@ -4290,14 +4170,14 @@
               <a:effectLst/>
               <a:extLst>
                 <a:ext uri="{909E8E84-426E-40DD-AFC4-6F175D3DCCD1}">
-                  <a14:hiddenFill xmlns="" xmlns:a14="http://schemas.microsoft.com/office/drawing/2010/main">
+                  <a14:hiddenFill xmlns:a14="http://schemas.microsoft.com/office/drawing/2010/main" xmlns="">
                     <a:solidFill>
                       <a:schemeClr val="accent1"/>
                     </a:solidFill>
                   </a14:hiddenFill>
                 </a:ext>
                 <a:ext uri="{AF507438-7753-43E0-B8FC-AC1667EBCBE1}">
-                  <a14:hiddenEffects xmlns="" xmlns:a14="http://schemas.microsoft.com/office/drawing/2010/main">
+                  <a14:hiddenEffects xmlns:a14="http://schemas.microsoft.com/office/drawing/2010/main" xmlns="">
                     <a:effectLst>
                       <a:outerShdw dist="35921" dir="2700000" algn="ctr" rotWithShape="0">
                         <a:schemeClr val="bg2"/>
@@ -4320,7 +4200,7 @@
               <a:blip r:embed="rId5" cstate="print">
                 <a:extLst>
                   <a:ext uri="{28A0092B-C50C-407E-A947-70E740481C1C}">
-                    <a14:useLocalDpi xmlns="" xmlns:a14="http://schemas.microsoft.com/office/drawing/2010/main" val="0"/>
+                    <a14:useLocalDpi xmlns:a14="http://schemas.microsoft.com/office/drawing/2010/main" xmlns="" val="0"/>
                   </a:ext>
                 </a:extLst>
               </a:blip>
@@ -4349,14 +4229,14 @@
               <a:effectLst/>
               <a:extLst>
                 <a:ext uri="{909E8E84-426E-40DD-AFC4-6F175D3DCCD1}">
-                  <a14:hiddenFill xmlns="" xmlns:a14="http://schemas.microsoft.com/office/drawing/2010/main">
+                  <a14:hiddenFill xmlns:a14="http://schemas.microsoft.com/office/drawing/2010/main" xmlns="">
                     <a:solidFill>
                       <a:schemeClr val="accent1"/>
                     </a:solidFill>
                   </a14:hiddenFill>
                 </a:ext>
                 <a:ext uri="{AF507438-7753-43E0-B8FC-AC1667EBCBE1}">
-                  <a14:hiddenEffects xmlns="" xmlns:a14="http://schemas.microsoft.com/office/drawing/2010/main">
+                  <a14:hiddenEffects xmlns:a14="http://schemas.microsoft.com/office/drawing/2010/main" xmlns="">
                     <a:effectLst>
                       <a:outerShdw dist="35921" dir="2700000" algn="ctr" rotWithShape="0">
                         <a:schemeClr val="bg2"/>
@@ -4733,7 +4613,7 @@
     </p:spTree>
     <p:extLst>
       <p:ext uri="{BB962C8B-B14F-4D97-AF65-F5344CB8AC3E}">
-        <p14:creationId xmlns="" xmlns:p14="http://schemas.microsoft.com/office/powerpoint/2010/main" val="2358022711"/>
+        <p14:creationId xmlns:p14="http://schemas.microsoft.com/office/powerpoint/2010/main" xmlns="" val="2358022711"/>
       </p:ext>
     </p:extLst>
   </p:cSld>
@@ -4807,10 +4687,10 @@
           <p:nvPr/>
         </p:nvPicPr>
         <p:blipFill>
-          <a:blip r:embed="rId2">
+          <a:blip r:embed="rId2" cstate="print">
             <a:extLst>
               <a:ext uri="{28A0092B-C50C-407E-A947-70E740481C1C}">
-                <a14:useLocalDpi xmlns="" xmlns:a14="http://schemas.microsoft.com/office/drawing/2010/main" val="0"/>
+                <a14:useLocalDpi xmlns:a14="http://schemas.microsoft.com/office/drawing/2010/main" xmlns="" val="0"/>
               </a:ext>
             </a:extLst>
           </a:blip>
@@ -4834,14 +4714,14 @@
           <a:effectLst/>
           <a:extLst>
             <a:ext uri="{909E8E84-426E-40DD-AFC4-6F175D3DCCD1}">
-              <a14:hiddenFill xmlns="" xmlns:a14="http://schemas.microsoft.com/office/drawing/2010/main">
+              <a14:hiddenFill xmlns:a14="http://schemas.microsoft.com/office/drawing/2010/main" xmlns="">
                 <a:solidFill>
                   <a:schemeClr val="accent1"/>
                 </a:solidFill>
               </a14:hiddenFill>
             </a:ext>
             <a:ext uri="{91240B29-F687-4F45-9708-019B960494DF}">
-              <a14:hiddenLine xmlns="" xmlns:a14="http://schemas.microsoft.com/office/drawing/2010/main" w="9525">
+              <a14:hiddenLine xmlns:a14="http://schemas.microsoft.com/office/drawing/2010/main" xmlns="" w="9525">
                 <a:solidFill>
                   <a:schemeClr val="tx1"/>
                 </a:solidFill>
@@ -4851,7 +4731,7 @@
               </a14:hiddenLine>
             </a:ext>
             <a:ext uri="{AF507438-7753-43E0-B8FC-AC1667EBCBE1}">
-              <a14:hiddenEffects xmlns="" xmlns:a14="http://schemas.microsoft.com/office/drawing/2010/main">
+              <a14:hiddenEffects xmlns:a14="http://schemas.microsoft.com/office/drawing/2010/main" xmlns="">
                 <a:effectLst>
                   <a:outerShdw dist="35921" dir="2700000" algn="ctr" rotWithShape="0">
                     <a:schemeClr val="bg2"/>
@@ -4895,7 +4775,7 @@
     </p:spTree>
     <p:extLst>
       <p:ext uri="{BB962C8B-B14F-4D97-AF65-F5344CB8AC3E}">
-        <p14:creationId xmlns="" xmlns:p14="http://schemas.microsoft.com/office/powerpoint/2010/main" val="1222455737"/>
+        <p14:creationId xmlns:p14="http://schemas.microsoft.com/office/powerpoint/2010/main" xmlns="" val="1222455737"/>
       </p:ext>
     </p:extLst>
   </p:cSld>
@@ -4931,7 +4811,7 @@
           <p:nvPr/>
         </p:nvPicPr>
         <p:blipFill>
-          <a:blip r:embed="rId2"/>
+          <a:blip r:embed="rId2" cstate="print"/>
           <a:srcRect/>
           <a:stretch>
             <a:fillRect/>
@@ -4958,7 +4838,7 @@
     </p:spTree>
     <p:extLst>
       <p:ext uri="{BB962C8B-B14F-4D97-AF65-F5344CB8AC3E}">
-        <p14:creationId xmlns="" xmlns:p14="http://schemas.microsoft.com/office/powerpoint/2010/main" val="3551393168"/>
+        <p14:creationId xmlns:p14="http://schemas.microsoft.com/office/powerpoint/2010/main" xmlns="" val="3551393168"/>
       </p:ext>
     </p:extLst>
   </p:cSld>
@@ -4994,10 +4874,10 @@
           <p:nvPr/>
         </p:nvPicPr>
         <p:blipFill>
-          <a:blip r:embed="rId2">
+          <a:blip r:embed="rId2" cstate="print">
             <a:extLst>
               <a:ext uri="{28A0092B-C50C-407E-A947-70E740481C1C}">
-                <a14:useLocalDpi xmlns="" xmlns:a14="http://schemas.microsoft.com/office/drawing/2010/main" val="0"/>
+                <a14:useLocalDpi xmlns:a14="http://schemas.microsoft.com/office/drawing/2010/main" xmlns="" val="0"/>
               </a:ext>
             </a:extLst>
           </a:blip>
@@ -5017,7 +4897,7 @@
           <a:noFill/>
           <a:extLst>
             <a:ext uri="{909E8E84-426E-40DD-AFC4-6F175D3DCCD1}">
-              <a14:hiddenFill xmlns="" xmlns:a14="http://schemas.microsoft.com/office/drawing/2010/main">
+              <a14:hiddenFill xmlns:a14="http://schemas.microsoft.com/office/drawing/2010/main" xmlns="">
                 <a:solidFill>
                   <a:srgbClr val="FFFFFF"/>
                 </a:solidFill>
@@ -5238,7 +5118,7 @@
     </p:spTree>
     <p:extLst>
       <p:ext uri="{BB962C8B-B14F-4D97-AF65-F5344CB8AC3E}">
-        <p14:creationId xmlns="" xmlns:p14="http://schemas.microsoft.com/office/powerpoint/2010/main" val="1761084381"/>
+        <p14:creationId xmlns:p14="http://schemas.microsoft.com/office/powerpoint/2010/main" xmlns="" val="1761084381"/>
       </p:ext>
     </p:extLst>
   </p:cSld>
@@ -5274,10 +5154,10 @@
           <p:nvPr/>
         </p:nvPicPr>
         <p:blipFill>
-          <a:blip r:embed="rId2">
+          <a:blip r:embed="rId2" cstate="print">
             <a:extLst>
               <a:ext uri="{28A0092B-C50C-407E-A947-70E740481C1C}">
-                <a14:useLocalDpi xmlns="" xmlns:a14="http://schemas.microsoft.com/office/drawing/2010/main" val="0"/>
+                <a14:useLocalDpi xmlns:a14="http://schemas.microsoft.com/office/drawing/2010/main" xmlns="" val="0"/>
               </a:ext>
             </a:extLst>
           </a:blip>
@@ -5297,7 +5177,7 @@
           <a:noFill/>
           <a:extLst>
             <a:ext uri="{909E8E84-426E-40DD-AFC4-6F175D3DCCD1}">
-              <a14:hiddenFill xmlns="" xmlns:a14="http://schemas.microsoft.com/office/drawing/2010/main">
+              <a14:hiddenFill xmlns:a14="http://schemas.microsoft.com/office/drawing/2010/main" xmlns="">
                 <a:solidFill>
                   <a:srgbClr val="FFFFFF"/>
                 </a:solidFill>
@@ -5402,7 +5282,7 @@
     </p:spTree>
     <p:extLst>
       <p:ext uri="{BB962C8B-B14F-4D97-AF65-F5344CB8AC3E}">
-        <p14:creationId xmlns="" xmlns:p14="http://schemas.microsoft.com/office/powerpoint/2010/main" val="2851968572"/>
+        <p14:creationId xmlns:p14="http://schemas.microsoft.com/office/powerpoint/2010/main" xmlns="" val="2851968572"/>
       </p:ext>
     </p:extLst>
   </p:cSld>
@@ -5438,10 +5318,10 @@
           <p:nvPr/>
         </p:nvPicPr>
         <p:blipFill>
-          <a:blip r:embed="rId2">
+          <a:blip r:embed="rId2" cstate="print">
             <a:extLst>
               <a:ext uri="{28A0092B-C50C-407E-A947-70E740481C1C}">
-                <a14:useLocalDpi xmlns="" xmlns:a14="http://schemas.microsoft.com/office/drawing/2010/main" val="0"/>
+                <a14:useLocalDpi xmlns:a14="http://schemas.microsoft.com/office/drawing/2010/main" xmlns="" val="0"/>
               </a:ext>
             </a:extLst>
           </a:blip>
@@ -5461,7 +5341,7 @@
           <a:noFill/>
           <a:extLst>
             <a:ext uri="{909E8E84-426E-40DD-AFC4-6F175D3DCCD1}">
-              <a14:hiddenFill xmlns="" xmlns:a14="http://schemas.microsoft.com/office/drawing/2010/main">
+              <a14:hiddenFill xmlns:a14="http://schemas.microsoft.com/office/drawing/2010/main" xmlns="">
                 <a:solidFill>
                   <a:srgbClr val="FFFFFF"/>
                 </a:solidFill>
@@ -5473,7 +5353,7 @@
     </p:spTree>
     <p:extLst>
       <p:ext uri="{BB962C8B-B14F-4D97-AF65-F5344CB8AC3E}">
-        <p14:creationId xmlns="" xmlns:p14="http://schemas.microsoft.com/office/powerpoint/2010/main" val="2851968572"/>
+        <p14:creationId xmlns:p14="http://schemas.microsoft.com/office/powerpoint/2010/main" xmlns="" val="2851968572"/>
       </p:ext>
     </p:extLst>
   </p:cSld>
@@ -5509,10 +5389,10 @@
           <p:nvPr/>
         </p:nvPicPr>
         <p:blipFill>
-          <a:blip r:embed="rId2">
+          <a:blip r:embed="rId2" cstate="print">
             <a:extLst>
               <a:ext uri="{28A0092B-C50C-407E-A947-70E740481C1C}">
-                <a14:useLocalDpi xmlns="" xmlns:a14="http://schemas.microsoft.com/office/drawing/2010/main" val="0"/>
+                <a14:useLocalDpi xmlns:a14="http://schemas.microsoft.com/office/drawing/2010/main" xmlns="" val="0"/>
               </a:ext>
             </a:extLst>
           </a:blip>
@@ -5532,7 +5412,7 @@
           <a:noFill/>
           <a:extLst>
             <a:ext uri="{909E8E84-426E-40DD-AFC4-6F175D3DCCD1}">
-              <a14:hiddenFill xmlns="" xmlns:a14="http://schemas.microsoft.com/office/drawing/2010/main">
+              <a14:hiddenFill xmlns:a14="http://schemas.microsoft.com/office/drawing/2010/main" xmlns="">
                 <a:solidFill>
                   <a:srgbClr val="FFFFFF"/>
                 </a:solidFill>
@@ -5544,7 +5424,7 @@
     </p:spTree>
     <p:extLst>
       <p:ext uri="{BB962C8B-B14F-4D97-AF65-F5344CB8AC3E}">
-        <p14:creationId xmlns="" xmlns:p14="http://schemas.microsoft.com/office/powerpoint/2010/main" val="2851968572"/>
+        <p14:creationId xmlns:p14="http://schemas.microsoft.com/office/powerpoint/2010/main" xmlns="" val="2851968572"/>
       </p:ext>
     </p:extLst>
   </p:cSld>
@@ -5580,10 +5460,10 @@
           <p:nvPr/>
         </p:nvPicPr>
         <p:blipFill>
-          <a:blip r:embed="rId2">
+          <a:blip r:embed="rId2" cstate="print">
             <a:extLst>
               <a:ext uri="{28A0092B-C50C-407E-A947-70E740481C1C}">
-                <a14:useLocalDpi xmlns="" xmlns:a14="http://schemas.microsoft.com/office/drawing/2010/main" val="0"/>
+                <a14:useLocalDpi xmlns:a14="http://schemas.microsoft.com/office/drawing/2010/main" xmlns="" val="0"/>
               </a:ext>
             </a:extLst>
           </a:blip>
@@ -5603,7 +5483,7 @@
           <a:noFill/>
           <a:extLst>
             <a:ext uri="{909E8E84-426E-40DD-AFC4-6F175D3DCCD1}">
-              <a14:hiddenFill xmlns="" xmlns:a14="http://schemas.microsoft.com/office/drawing/2010/main">
+              <a14:hiddenFill xmlns:a14="http://schemas.microsoft.com/office/drawing/2010/main" xmlns="">
                 <a:solidFill>
                   <a:srgbClr val="FFFFFF"/>
                 </a:solidFill>
@@ -5615,7 +5495,7 @@
     </p:spTree>
     <p:extLst>
       <p:ext uri="{BB962C8B-B14F-4D97-AF65-F5344CB8AC3E}">
-        <p14:creationId xmlns="" xmlns:p14="http://schemas.microsoft.com/office/powerpoint/2010/main" val="3834709605"/>
+        <p14:creationId xmlns:p14="http://schemas.microsoft.com/office/powerpoint/2010/main" xmlns="" val="3834709605"/>
       </p:ext>
     </p:extLst>
   </p:cSld>
@@ -5651,10 +5531,10 @@
           <p:nvPr/>
         </p:nvPicPr>
         <p:blipFill>
-          <a:blip r:embed="rId2">
+          <a:blip r:embed="rId2" cstate="print">
             <a:extLst>
               <a:ext uri="{28A0092B-C50C-407E-A947-70E740481C1C}">
-                <a14:useLocalDpi xmlns="" xmlns:a14="http://schemas.microsoft.com/office/drawing/2010/main" val="0"/>
+                <a14:useLocalDpi xmlns:a14="http://schemas.microsoft.com/office/drawing/2010/main" xmlns="" val="0"/>
               </a:ext>
             </a:extLst>
           </a:blip>
@@ -5674,7 +5554,7 @@
           <a:noFill/>
           <a:extLst>
             <a:ext uri="{909E8E84-426E-40DD-AFC4-6F175D3DCCD1}">
-              <a14:hiddenFill xmlns="" xmlns:a14="http://schemas.microsoft.com/office/drawing/2010/main">
+              <a14:hiddenFill xmlns:a14="http://schemas.microsoft.com/office/drawing/2010/main" xmlns="">
                 <a:solidFill>
                   <a:srgbClr val="FFFFFF"/>
                 </a:solidFill>
@@ -5813,7 +5693,7 @@
     </p:spTree>
     <p:extLst>
       <p:ext uri="{BB962C8B-B14F-4D97-AF65-F5344CB8AC3E}">
-        <p14:creationId xmlns="" xmlns:p14="http://schemas.microsoft.com/office/powerpoint/2010/main" val="3944887229"/>
+        <p14:creationId xmlns:p14="http://schemas.microsoft.com/office/powerpoint/2010/main" xmlns="" val="3944887229"/>
       </p:ext>
     </p:extLst>
   </p:cSld>
@@ -5852,7 +5732,7 @@
           <a:blip r:embed="rId2" cstate="print">
             <a:extLst>
               <a:ext uri="{28A0092B-C50C-407E-A947-70E740481C1C}">
-                <a14:useLocalDpi xmlns="" xmlns:a14="http://schemas.microsoft.com/office/drawing/2010/main" val="0"/>
+                <a14:useLocalDpi xmlns:a14="http://schemas.microsoft.com/office/drawing/2010/main" xmlns="" val="0"/>
               </a:ext>
             </a:extLst>
           </a:blip>
@@ -5872,7 +5752,7 @@
           <a:noFill/>
           <a:extLst>
             <a:ext uri="{909E8E84-426E-40DD-AFC4-6F175D3DCCD1}">
-              <a14:hiddenFill xmlns="" xmlns:a14="http://schemas.microsoft.com/office/drawing/2010/main">
+              <a14:hiddenFill xmlns:a14="http://schemas.microsoft.com/office/drawing/2010/main" xmlns="">
                 <a:solidFill>
                   <a:srgbClr val="FFFFFF"/>
                 </a:solidFill>
@@ -5884,7 +5764,7 @@
     </p:spTree>
     <p:extLst>
       <p:ext uri="{BB962C8B-B14F-4D97-AF65-F5344CB8AC3E}">
-        <p14:creationId xmlns="" xmlns:p14="http://schemas.microsoft.com/office/powerpoint/2010/main" val="877918525"/>
+        <p14:creationId xmlns:p14="http://schemas.microsoft.com/office/powerpoint/2010/main" xmlns="" val="877918525"/>
       </p:ext>
     </p:extLst>
   </p:cSld>
@@ -5931,7 +5811,7 @@
           <a:blip r:embed="rId2" cstate="print">
             <a:extLst>
               <a:ext uri="{28A0092B-C50C-407E-A947-70E740481C1C}">
-                <a14:useLocalDpi xmlns="" xmlns:a14="http://schemas.microsoft.com/office/drawing/2010/main" val="0"/>
+                <a14:useLocalDpi xmlns:a14="http://schemas.microsoft.com/office/drawing/2010/main" xmlns="" val="0"/>
               </a:ext>
             </a:extLst>
           </a:blip>
@@ -5951,7 +5831,7 @@
           <a:noFill/>
           <a:extLst>
             <a:ext uri="{909E8E84-426E-40DD-AFC4-6F175D3DCCD1}">
-              <a14:hiddenFill xmlns="" xmlns:a14="http://schemas.microsoft.com/office/drawing/2010/main">
+              <a14:hiddenFill xmlns:a14="http://schemas.microsoft.com/office/drawing/2010/main" xmlns="">
                 <a:solidFill>
                   <a:srgbClr val="FFFFFF"/>
                 </a:solidFill>
@@ -5963,7 +5843,7 @@
     </p:spTree>
     <p:extLst>
       <p:ext uri="{BB962C8B-B14F-4D97-AF65-F5344CB8AC3E}">
-        <p14:creationId xmlns="" xmlns:p14="http://schemas.microsoft.com/office/powerpoint/2010/main" val="3176543279"/>
+        <p14:creationId xmlns:p14="http://schemas.microsoft.com/office/powerpoint/2010/main" xmlns="" val="3176543279"/>
       </p:ext>
     </p:extLst>
   </p:cSld>
@@ -6010,7 +5890,7 @@
           <a:blip r:embed="rId2" cstate="print">
             <a:extLst>
               <a:ext uri="{28A0092B-C50C-407E-A947-70E740481C1C}">
-                <a14:useLocalDpi xmlns="" xmlns:a14="http://schemas.microsoft.com/office/drawing/2010/main" val="0"/>
+                <a14:useLocalDpi xmlns:a14="http://schemas.microsoft.com/office/drawing/2010/main" xmlns="" val="0"/>
               </a:ext>
             </a:extLst>
           </a:blip>
@@ -6030,7 +5910,7 @@
           <a:noFill/>
           <a:extLst>
             <a:ext uri="{909E8E84-426E-40DD-AFC4-6F175D3DCCD1}">
-              <a14:hiddenFill xmlns="" xmlns:a14="http://schemas.microsoft.com/office/drawing/2010/main">
+              <a14:hiddenFill xmlns:a14="http://schemas.microsoft.com/office/drawing/2010/main" xmlns="">
                 <a:solidFill>
                   <a:srgbClr val="FFFFFF"/>
                 </a:solidFill>
@@ -6042,7 +5922,7 @@
     </p:spTree>
     <p:extLst>
       <p:ext uri="{BB962C8B-B14F-4D97-AF65-F5344CB8AC3E}">
-        <p14:creationId xmlns="" xmlns:p14="http://schemas.microsoft.com/office/powerpoint/2010/main" val="3434212402"/>
+        <p14:creationId xmlns:p14="http://schemas.microsoft.com/office/powerpoint/2010/main" xmlns="" val="3434212402"/>
       </p:ext>
     </p:extLst>
   </p:cSld>
@@ -6124,10 +6004,10 @@
           <p:nvPr/>
         </p:nvPicPr>
         <p:blipFill>
-          <a:blip r:embed="rId2">
+          <a:blip r:embed="rId2" cstate="print">
             <a:extLst>
               <a:ext uri="{28A0092B-C50C-407E-A947-70E740481C1C}">
-                <a14:useLocalDpi xmlns="" xmlns:a14="http://schemas.microsoft.com/office/drawing/2010/main" val="0"/>
+                <a14:useLocalDpi xmlns:a14="http://schemas.microsoft.com/office/drawing/2010/main" xmlns="" val="0"/>
               </a:ext>
             </a:extLst>
           </a:blip>
@@ -6151,14 +6031,14 @@
           <a:effectLst/>
           <a:extLst>
             <a:ext uri="{909E8E84-426E-40DD-AFC4-6F175D3DCCD1}">
-              <a14:hiddenFill xmlns="" xmlns:a14="http://schemas.microsoft.com/office/drawing/2010/main">
+              <a14:hiddenFill xmlns:a14="http://schemas.microsoft.com/office/drawing/2010/main" xmlns="">
                 <a:solidFill>
                   <a:schemeClr val="accent1"/>
                 </a:solidFill>
               </a14:hiddenFill>
             </a:ext>
             <a:ext uri="{91240B29-F687-4F45-9708-019B960494DF}">
-              <a14:hiddenLine xmlns="" xmlns:a14="http://schemas.microsoft.com/office/drawing/2010/main" w="9525">
+              <a14:hiddenLine xmlns:a14="http://schemas.microsoft.com/office/drawing/2010/main" xmlns="" w="9525">
                 <a:solidFill>
                   <a:schemeClr val="tx1"/>
                 </a:solidFill>
@@ -6168,7 +6048,7 @@
               </a14:hiddenLine>
             </a:ext>
             <a:ext uri="{AF507438-7753-43E0-B8FC-AC1667EBCBE1}">
-              <a14:hiddenEffects xmlns="" xmlns:a14="http://schemas.microsoft.com/office/drawing/2010/main">
+              <a14:hiddenEffects xmlns:a14="http://schemas.microsoft.com/office/drawing/2010/main" xmlns="">
                 <a:effectLst>
                   <a:outerShdw dist="35921" dir="2700000" algn="ctr" rotWithShape="0">
                     <a:schemeClr val="bg2"/>
@@ -6293,7 +6173,7 @@
     </p:spTree>
     <p:extLst>
       <p:ext uri="{BB962C8B-B14F-4D97-AF65-F5344CB8AC3E}">
-        <p14:creationId xmlns="" xmlns:p14="http://schemas.microsoft.com/office/powerpoint/2010/main" val="2025987737"/>
+        <p14:creationId xmlns:p14="http://schemas.microsoft.com/office/powerpoint/2010/main" xmlns="" val="2025987737"/>
       </p:ext>
     </p:extLst>
   </p:cSld>
@@ -6332,7 +6212,7 @@
           <a:blip r:embed="rId2" cstate="print">
             <a:extLst>
               <a:ext uri="{28A0092B-C50C-407E-A947-70E740481C1C}">
-                <a14:useLocalDpi xmlns="" xmlns:a14="http://schemas.microsoft.com/office/drawing/2010/main" val="0"/>
+                <a14:useLocalDpi xmlns:a14="http://schemas.microsoft.com/office/drawing/2010/main" xmlns="" val="0"/>
               </a:ext>
             </a:extLst>
           </a:blip>
@@ -6352,7 +6232,7 @@
           <a:noFill/>
           <a:extLst>
             <a:ext uri="{909E8E84-426E-40DD-AFC4-6F175D3DCCD1}">
-              <a14:hiddenFill xmlns="" xmlns:a14="http://schemas.microsoft.com/office/drawing/2010/main">
+              <a14:hiddenFill xmlns:a14="http://schemas.microsoft.com/office/drawing/2010/main" xmlns="">
                 <a:solidFill>
                   <a:srgbClr val="FFFFFF"/>
                 </a:solidFill>
@@ -6364,7 +6244,7 @@
     </p:spTree>
     <p:extLst>
       <p:ext uri="{BB962C8B-B14F-4D97-AF65-F5344CB8AC3E}">
-        <p14:creationId xmlns="" xmlns:p14="http://schemas.microsoft.com/office/powerpoint/2010/main" val="2665957509"/>
+        <p14:creationId xmlns:p14="http://schemas.microsoft.com/office/powerpoint/2010/main" xmlns="" val="2665957509"/>
       </p:ext>
     </p:extLst>
   </p:cSld>
@@ -6411,7 +6291,7 @@
           <a:blip r:embed="rId2" cstate="print">
             <a:extLst>
               <a:ext uri="{28A0092B-C50C-407E-A947-70E740481C1C}">
-                <a14:useLocalDpi xmlns="" xmlns:a14="http://schemas.microsoft.com/office/drawing/2010/main" val="0"/>
+                <a14:useLocalDpi xmlns:a14="http://schemas.microsoft.com/office/drawing/2010/main" xmlns="" val="0"/>
               </a:ext>
             </a:extLst>
           </a:blip>
@@ -6431,7 +6311,7 @@
           <a:noFill/>
           <a:extLst>
             <a:ext uri="{909E8E84-426E-40DD-AFC4-6F175D3DCCD1}">
-              <a14:hiddenFill xmlns="" xmlns:a14="http://schemas.microsoft.com/office/drawing/2010/main">
+              <a14:hiddenFill xmlns:a14="http://schemas.microsoft.com/office/drawing/2010/main" xmlns="">
                 <a:solidFill>
                   <a:srgbClr val="FFFFFF"/>
                 </a:solidFill>
@@ -6443,7 +6323,7 @@
     </p:spTree>
     <p:extLst>
       <p:ext uri="{BB962C8B-B14F-4D97-AF65-F5344CB8AC3E}">
-        <p14:creationId xmlns="" xmlns:p14="http://schemas.microsoft.com/office/powerpoint/2010/main" val="2883297758"/>
+        <p14:creationId xmlns:p14="http://schemas.microsoft.com/office/powerpoint/2010/main" xmlns="" val="2883297758"/>
       </p:ext>
     </p:extLst>
   </p:cSld>
@@ -6490,7 +6370,7 @@
           <a:blip r:embed="rId2" cstate="print">
             <a:extLst>
               <a:ext uri="{28A0092B-C50C-407E-A947-70E740481C1C}">
-                <a14:useLocalDpi xmlns="" xmlns:a14="http://schemas.microsoft.com/office/drawing/2010/main" val="0"/>
+                <a14:useLocalDpi xmlns:a14="http://schemas.microsoft.com/office/drawing/2010/main" xmlns="" val="0"/>
               </a:ext>
             </a:extLst>
           </a:blip>
@@ -6510,7 +6390,7 @@
           <a:noFill/>
           <a:extLst>
             <a:ext uri="{909E8E84-426E-40DD-AFC4-6F175D3DCCD1}">
-              <a14:hiddenFill xmlns="" xmlns:a14="http://schemas.microsoft.com/office/drawing/2010/main">
+              <a14:hiddenFill xmlns:a14="http://schemas.microsoft.com/office/drawing/2010/main" xmlns="">
                 <a:solidFill>
                   <a:srgbClr val="FFFFFF"/>
                 </a:solidFill>
@@ -6522,7 +6402,7 @@
     </p:spTree>
     <p:extLst>
       <p:ext uri="{BB962C8B-B14F-4D97-AF65-F5344CB8AC3E}">
-        <p14:creationId xmlns="" xmlns:p14="http://schemas.microsoft.com/office/powerpoint/2010/main" val="2360957746"/>
+        <p14:creationId xmlns:p14="http://schemas.microsoft.com/office/powerpoint/2010/main" xmlns="" val="2360957746"/>
       </p:ext>
     </p:extLst>
   </p:cSld>
@@ -6569,7 +6449,7 @@
           <a:blip r:embed="rId2" cstate="print">
             <a:extLst>
               <a:ext uri="{28A0092B-C50C-407E-A947-70E740481C1C}">
-                <a14:useLocalDpi xmlns="" xmlns:a14="http://schemas.microsoft.com/office/drawing/2010/main" val="0"/>
+                <a14:useLocalDpi xmlns:a14="http://schemas.microsoft.com/office/drawing/2010/main" xmlns="" val="0"/>
               </a:ext>
             </a:extLst>
           </a:blip>
@@ -6589,7 +6469,7 @@
           <a:noFill/>
           <a:extLst>
             <a:ext uri="{909E8E84-426E-40DD-AFC4-6F175D3DCCD1}">
-              <a14:hiddenFill xmlns="" xmlns:a14="http://schemas.microsoft.com/office/drawing/2010/main">
+              <a14:hiddenFill xmlns:a14="http://schemas.microsoft.com/office/drawing/2010/main" xmlns="">
                 <a:solidFill>
                   <a:srgbClr val="FFFFFF"/>
                 </a:solidFill>
@@ -6601,7 +6481,7 @@
     </p:spTree>
     <p:extLst>
       <p:ext uri="{BB962C8B-B14F-4D97-AF65-F5344CB8AC3E}">
-        <p14:creationId xmlns="" xmlns:p14="http://schemas.microsoft.com/office/powerpoint/2010/main" val="334552316"/>
+        <p14:creationId xmlns:p14="http://schemas.microsoft.com/office/powerpoint/2010/main" xmlns="" val="334552316"/>
       </p:ext>
     </p:extLst>
   </p:cSld>
@@ -6648,7 +6528,7 @@
           <a:blip r:embed="rId2" cstate="print">
             <a:extLst>
               <a:ext uri="{28A0092B-C50C-407E-A947-70E740481C1C}">
-                <a14:useLocalDpi xmlns="" xmlns:a14="http://schemas.microsoft.com/office/drawing/2010/main" val="0"/>
+                <a14:useLocalDpi xmlns:a14="http://schemas.microsoft.com/office/drawing/2010/main" xmlns="" val="0"/>
               </a:ext>
             </a:extLst>
           </a:blip>
@@ -6668,7 +6548,7 @@
           <a:noFill/>
           <a:extLst>
             <a:ext uri="{909E8E84-426E-40DD-AFC4-6F175D3DCCD1}">
-              <a14:hiddenFill xmlns="" xmlns:a14="http://schemas.microsoft.com/office/drawing/2010/main">
+              <a14:hiddenFill xmlns:a14="http://schemas.microsoft.com/office/drawing/2010/main" xmlns="">
                 <a:solidFill>
                   <a:srgbClr val="FFFFFF"/>
                 </a:solidFill>
@@ -6863,7 +6743,7 @@
     </p:spTree>
     <p:extLst>
       <p:ext uri="{BB962C8B-B14F-4D97-AF65-F5344CB8AC3E}">
-        <p14:creationId xmlns="" xmlns:p14="http://schemas.microsoft.com/office/powerpoint/2010/main" val="2188434631"/>
+        <p14:creationId xmlns:p14="http://schemas.microsoft.com/office/powerpoint/2010/main" xmlns="" val="2188434631"/>
       </p:ext>
     </p:extLst>
   </p:cSld>
@@ -6910,7 +6790,7 @@
           <a:blip r:embed="rId2" cstate="print">
             <a:extLst>
               <a:ext uri="{28A0092B-C50C-407E-A947-70E740481C1C}">
-                <a14:useLocalDpi xmlns="" xmlns:a14="http://schemas.microsoft.com/office/drawing/2010/main" val="0"/>
+                <a14:useLocalDpi xmlns:a14="http://schemas.microsoft.com/office/drawing/2010/main" xmlns="" val="0"/>
               </a:ext>
             </a:extLst>
           </a:blip>
@@ -6930,7 +6810,7 @@
           <a:noFill/>
           <a:extLst>
             <a:ext uri="{909E8E84-426E-40DD-AFC4-6F175D3DCCD1}">
-              <a14:hiddenFill xmlns="" xmlns:a14="http://schemas.microsoft.com/office/drawing/2010/main">
+              <a14:hiddenFill xmlns:a14="http://schemas.microsoft.com/office/drawing/2010/main" xmlns="">
                 <a:solidFill>
                   <a:srgbClr val="FFFFFF"/>
                 </a:solidFill>
@@ -6987,7 +6867,7 @@
     </p:spTree>
     <p:extLst>
       <p:ext uri="{BB962C8B-B14F-4D97-AF65-F5344CB8AC3E}">
-        <p14:creationId xmlns="" xmlns:p14="http://schemas.microsoft.com/office/powerpoint/2010/main" val="396975966"/>
+        <p14:creationId xmlns:p14="http://schemas.microsoft.com/office/powerpoint/2010/main" xmlns="" val="396975966"/>
       </p:ext>
     </p:extLst>
   </p:cSld>
@@ -7034,7 +6914,7 @@
           <a:blip r:embed="rId2" cstate="print">
             <a:extLst>
               <a:ext uri="{28A0092B-C50C-407E-A947-70E740481C1C}">
-                <a14:useLocalDpi xmlns="" xmlns:a14="http://schemas.microsoft.com/office/drawing/2010/main" val="0"/>
+                <a14:useLocalDpi xmlns:a14="http://schemas.microsoft.com/office/drawing/2010/main" xmlns="" val="0"/>
               </a:ext>
             </a:extLst>
           </a:blip>
@@ -7054,7 +6934,7 @@
           <a:noFill/>
           <a:extLst>
             <a:ext uri="{909E8E84-426E-40DD-AFC4-6F175D3DCCD1}">
-              <a14:hiddenFill xmlns="" xmlns:a14="http://schemas.microsoft.com/office/drawing/2010/main">
+              <a14:hiddenFill xmlns:a14="http://schemas.microsoft.com/office/drawing/2010/main" xmlns="">
                 <a:solidFill>
                   <a:srgbClr val="FFFFFF"/>
                 </a:solidFill>
@@ -7066,7 +6946,7 @@
     </p:spTree>
     <p:extLst>
       <p:ext uri="{BB962C8B-B14F-4D97-AF65-F5344CB8AC3E}">
-        <p14:creationId xmlns="" xmlns:p14="http://schemas.microsoft.com/office/powerpoint/2010/main" val="247157852"/>
+        <p14:creationId xmlns:p14="http://schemas.microsoft.com/office/powerpoint/2010/main" xmlns="" val="247157852"/>
       </p:ext>
     </p:extLst>
   </p:cSld>
@@ -7113,7 +6993,7 @@
           <a:blip r:embed="rId2" cstate="print">
             <a:extLst>
               <a:ext uri="{28A0092B-C50C-407E-A947-70E740481C1C}">
-                <a14:useLocalDpi xmlns="" xmlns:a14="http://schemas.microsoft.com/office/drawing/2010/main" val="0"/>
+                <a14:useLocalDpi xmlns:a14="http://schemas.microsoft.com/office/drawing/2010/main" xmlns="" val="0"/>
               </a:ext>
             </a:extLst>
           </a:blip>
@@ -7133,7 +7013,7 @@
           <a:noFill/>
           <a:extLst>
             <a:ext uri="{909E8E84-426E-40DD-AFC4-6F175D3DCCD1}">
-              <a14:hiddenFill xmlns="" xmlns:a14="http://schemas.microsoft.com/office/drawing/2010/main">
+              <a14:hiddenFill xmlns:a14="http://schemas.microsoft.com/office/drawing/2010/main" xmlns="">
                 <a:solidFill>
                   <a:srgbClr val="FFFFFF"/>
                 </a:solidFill>
@@ -7145,7 +7025,7 @@
     </p:spTree>
     <p:extLst>
       <p:ext uri="{BB962C8B-B14F-4D97-AF65-F5344CB8AC3E}">
-        <p14:creationId xmlns="" xmlns:p14="http://schemas.microsoft.com/office/powerpoint/2010/main" val="1090011476"/>
+        <p14:creationId xmlns:p14="http://schemas.microsoft.com/office/powerpoint/2010/main" xmlns="" val="1090011476"/>
       </p:ext>
     </p:extLst>
   </p:cSld>
@@ -7227,10 +7107,10 @@
           <p:nvPr/>
         </p:nvPicPr>
         <p:blipFill>
-          <a:blip r:embed="rId2">
+          <a:blip r:embed="rId2" cstate="print">
             <a:extLst>
               <a:ext uri="{28A0092B-C50C-407E-A947-70E740481C1C}">
-                <a14:useLocalDpi xmlns="" xmlns:a14="http://schemas.microsoft.com/office/drawing/2010/main" val="0"/>
+                <a14:useLocalDpi xmlns:a14="http://schemas.microsoft.com/office/drawing/2010/main" xmlns="" val="0"/>
               </a:ext>
             </a:extLst>
           </a:blip>
@@ -7254,14 +7134,14 @@
           <a:effectLst/>
           <a:extLst>
             <a:ext uri="{909E8E84-426E-40DD-AFC4-6F175D3DCCD1}">
-              <a14:hiddenFill xmlns="" xmlns:a14="http://schemas.microsoft.com/office/drawing/2010/main">
+              <a14:hiddenFill xmlns:a14="http://schemas.microsoft.com/office/drawing/2010/main" xmlns="">
                 <a:solidFill>
                   <a:schemeClr val="accent1"/>
                 </a:solidFill>
               </a14:hiddenFill>
             </a:ext>
             <a:ext uri="{91240B29-F687-4F45-9708-019B960494DF}">
-              <a14:hiddenLine xmlns="" xmlns:a14="http://schemas.microsoft.com/office/drawing/2010/main" w="9525">
+              <a14:hiddenLine xmlns:a14="http://schemas.microsoft.com/office/drawing/2010/main" xmlns="" w="9525">
                 <a:solidFill>
                   <a:schemeClr val="tx1"/>
                 </a:solidFill>
@@ -7271,7 +7151,7 @@
               </a14:hiddenLine>
             </a:ext>
             <a:ext uri="{AF507438-7753-43E0-B8FC-AC1667EBCBE1}">
-              <a14:hiddenEffects xmlns="" xmlns:a14="http://schemas.microsoft.com/office/drawing/2010/main">
+              <a14:hiddenEffects xmlns:a14="http://schemas.microsoft.com/office/drawing/2010/main" xmlns="">
                 <a:effectLst>
                   <a:outerShdw dist="35921" dir="2700000" algn="ctr" rotWithShape="0">
                     <a:schemeClr val="bg2"/>
@@ -7361,7 +7241,7 @@
     </p:spTree>
     <p:extLst>
       <p:ext uri="{BB962C8B-B14F-4D97-AF65-F5344CB8AC3E}">
-        <p14:creationId xmlns="" xmlns:p14="http://schemas.microsoft.com/office/powerpoint/2010/main" val="3792504104"/>
+        <p14:creationId xmlns:p14="http://schemas.microsoft.com/office/powerpoint/2010/main" xmlns="" val="3792504104"/>
       </p:ext>
     </p:extLst>
   </p:cSld>
@@ -7435,10 +7315,10 @@
           <p:nvPr/>
         </p:nvPicPr>
         <p:blipFill>
-          <a:blip r:embed="rId2">
+          <a:blip r:embed="rId2" cstate="print">
             <a:extLst>
               <a:ext uri="{28A0092B-C50C-407E-A947-70E740481C1C}">
-                <a14:useLocalDpi xmlns="" xmlns:a14="http://schemas.microsoft.com/office/drawing/2010/main" val="0"/>
+                <a14:useLocalDpi xmlns:a14="http://schemas.microsoft.com/office/drawing/2010/main" xmlns="" val="0"/>
               </a:ext>
             </a:extLst>
           </a:blip>
@@ -7462,14 +7342,14 @@
           <a:effectLst/>
           <a:extLst>
             <a:ext uri="{909E8E84-426E-40DD-AFC4-6F175D3DCCD1}">
-              <a14:hiddenFill xmlns="" xmlns:a14="http://schemas.microsoft.com/office/drawing/2010/main">
+              <a14:hiddenFill xmlns:a14="http://schemas.microsoft.com/office/drawing/2010/main" xmlns="">
                 <a:solidFill>
                   <a:schemeClr val="accent1"/>
                 </a:solidFill>
               </a14:hiddenFill>
             </a:ext>
             <a:ext uri="{91240B29-F687-4F45-9708-019B960494DF}">
-              <a14:hiddenLine xmlns="" xmlns:a14="http://schemas.microsoft.com/office/drawing/2010/main" w="9525">
+              <a14:hiddenLine xmlns:a14="http://schemas.microsoft.com/office/drawing/2010/main" xmlns="" w="9525">
                 <a:solidFill>
                   <a:schemeClr val="tx1"/>
                 </a:solidFill>
@@ -7479,7 +7359,7 @@
               </a14:hiddenLine>
             </a:ext>
             <a:ext uri="{AF507438-7753-43E0-B8FC-AC1667EBCBE1}">
-              <a14:hiddenEffects xmlns="" xmlns:a14="http://schemas.microsoft.com/office/drawing/2010/main">
+              <a14:hiddenEffects xmlns:a14="http://schemas.microsoft.com/office/drawing/2010/main" xmlns="">
                 <a:effectLst>
                   <a:outerShdw dist="35921" dir="2700000" algn="ctr" rotWithShape="0">
                     <a:schemeClr val="bg2"/>
@@ -7523,7 +7403,7 @@
     </p:spTree>
     <p:extLst>
       <p:ext uri="{BB962C8B-B14F-4D97-AF65-F5344CB8AC3E}">
-        <p14:creationId xmlns="" xmlns:p14="http://schemas.microsoft.com/office/powerpoint/2010/main" val="1178541986"/>
+        <p14:creationId xmlns:p14="http://schemas.microsoft.com/office/powerpoint/2010/main" xmlns="" val="1178541986"/>
       </p:ext>
     </p:extLst>
   </p:cSld>
@@ -7597,10 +7477,10 @@
           <p:nvPr/>
         </p:nvPicPr>
         <p:blipFill>
-          <a:blip r:embed="rId2">
+          <a:blip r:embed="rId2" cstate="print">
             <a:extLst>
               <a:ext uri="{28A0092B-C50C-407E-A947-70E740481C1C}">
-                <a14:useLocalDpi xmlns="" xmlns:a14="http://schemas.microsoft.com/office/drawing/2010/main" val="0"/>
+                <a14:useLocalDpi xmlns:a14="http://schemas.microsoft.com/office/drawing/2010/main" xmlns="" val="0"/>
               </a:ext>
             </a:extLst>
           </a:blip>
@@ -7624,14 +7504,14 @@
           <a:effectLst/>
           <a:extLst>
             <a:ext uri="{909E8E84-426E-40DD-AFC4-6F175D3DCCD1}">
-              <a14:hiddenFill xmlns="" xmlns:a14="http://schemas.microsoft.com/office/drawing/2010/main">
+              <a14:hiddenFill xmlns:a14="http://schemas.microsoft.com/office/drawing/2010/main" xmlns="">
                 <a:solidFill>
                   <a:schemeClr val="accent1"/>
                 </a:solidFill>
               </a14:hiddenFill>
             </a:ext>
             <a:ext uri="{91240B29-F687-4F45-9708-019B960494DF}">
-              <a14:hiddenLine xmlns="" xmlns:a14="http://schemas.microsoft.com/office/drawing/2010/main" w="9525">
+              <a14:hiddenLine xmlns:a14="http://schemas.microsoft.com/office/drawing/2010/main" xmlns="" w="9525">
                 <a:solidFill>
                   <a:schemeClr val="tx1"/>
                 </a:solidFill>
@@ -7641,7 +7521,7 @@
               </a14:hiddenLine>
             </a:ext>
             <a:ext uri="{AF507438-7753-43E0-B8FC-AC1667EBCBE1}">
-              <a14:hiddenEffects xmlns="" xmlns:a14="http://schemas.microsoft.com/office/drawing/2010/main">
+              <a14:hiddenEffects xmlns:a14="http://schemas.microsoft.com/office/drawing/2010/main" xmlns="">
                 <a:effectLst>
                   <a:outerShdw dist="35921" dir="2700000" algn="ctr" rotWithShape="0">
                     <a:schemeClr val="bg2"/>
@@ -7739,7 +7619,7 @@
     </p:spTree>
     <p:extLst>
       <p:ext uri="{BB962C8B-B14F-4D97-AF65-F5344CB8AC3E}">
-        <p14:creationId xmlns="" xmlns:p14="http://schemas.microsoft.com/office/powerpoint/2010/main" val="3840524966"/>
+        <p14:creationId xmlns:p14="http://schemas.microsoft.com/office/powerpoint/2010/main" xmlns="" val="3840524966"/>
       </p:ext>
     </p:extLst>
   </p:cSld>
@@ -7813,10 +7693,10 @@
           <p:nvPr/>
         </p:nvPicPr>
         <p:blipFill>
-          <a:blip r:embed="rId2">
+          <a:blip r:embed="rId2" cstate="print">
             <a:extLst>
               <a:ext uri="{28A0092B-C50C-407E-A947-70E740481C1C}">
-                <a14:useLocalDpi xmlns="" xmlns:a14="http://schemas.microsoft.com/office/drawing/2010/main" val="0"/>
+                <a14:useLocalDpi xmlns:a14="http://schemas.microsoft.com/office/drawing/2010/main" xmlns="" val="0"/>
               </a:ext>
             </a:extLst>
           </a:blip>
@@ -7840,14 +7720,14 @@
           <a:effectLst/>
           <a:extLst>
             <a:ext uri="{909E8E84-426E-40DD-AFC4-6F175D3DCCD1}">
-              <a14:hiddenFill xmlns="" xmlns:a14="http://schemas.microsoft.com/office/drawing/2010/main">
+              <a14:hiddenFill xmlns:a14="http://schemas.microsoft.com/office/drawing/2010/main" xmlns="">
                 <a:solidFill>
                   <a:schemeClr val="accent1"/>
                 </a:solidFill>
               </a14:hiddenFill>
             </a:ext>
             <a:ext uri="{91240B29-F687-4F45-9708-019B960494DF}">
-              <a14:hiddenLine xmlns="" xmlns:a14="http://schemas.microsoft.com/office/drawing/2010/main" w="9525">
+              <a14:hiddenLine xmlns:a14="http://schemas.microsoft.com/office/drawing/2010/main" xmlns="" w="9525">
                 <a:solidFill>
                   <a:schemeClr val="tx1"/>
                 </a:solidFill>
@@ -7857,7 +7737,7 @@
               </a14:hiddenLine>
             </a:ext>
             <a:ext uri="{AF507438-7753-43E0-B8FC-AC1667EBCBE1}">
-              <a14:hiddenEffects xmlns="" xmlns:a14="http://schemas.microsoft.com/office/drawing/2010/main">
+              <a14:hiddenEffects xmlns:a14="http://schemas.microsoft.com/office/drawing/2010/main" xmlns="">
                 <a:effectLst>
                   <a:outerShdw dist="35921" dir="2700000" algn="ctr" rotWithShape="0">
                     <a:schemeClr val="bg2"/>
@@ -7909,7 +7789,7 @@
     </p:spTree>
     <p:extLst>
       <p:ext uri="{BB962C8B-B14F-4D97-AF65-F5344CB8AC3E}">
-        <p14:creationId xmlns="" xmlns:p14="http://schemas.microsoft.com/office/powerpoint/2010/main" val="2111256600"/>
+        <p14:creationId xmlns:p14="http://schemas.microsoft.com/office/powerpoint/2010/main" xmlns="" val="2111256600"/>
       </p:ext>
     </p:extLst>
   </p:cSld>
@@ -7983,10 +7863,10 @@
           <p:nvPr/>
         </p:nvPicPr>
         <p:blipFill>
-          <a:blip r:embed="rId2">
+          <a:blip r:embed="rId2" cstate="print">
             <a:extLst>
               <a:ext uri="{28A0092B-C50C-407E-A947-70E740481C1C}">
-                <a14:useLocalDpi xmlns="" xmlns:a14="http://schemas.microsoft.com/office/drawing/2010/main" val="0"/>
+                <a14:useLocalDpi xmlns:a14="http://schemas.microsoft.com/office/drawing/2010/main" xmlns="" val="0"/>
               </a:ext>
             </a:extLst>
           </a:blip>
@@ -8010,14 +7890,14 @@
           <a:effectLst/>
           <a:extLst>
             <a:ext uri="{909E8E84-426E-40DD-AFC4-6F175D3DCCD1}">
-              <a14:hiddenFill xmlns="" xmlns:a14="http://schemas.microsoft.com/office/drawing/2010/main">
+              <a14:hiddenFill xmlns:a14="http://schemas.microsoft.com/office/drawing/2010/main" xmlns="">
                 <a:solidFill>
                   <a:schemeClr val="accent1"/>
                 </a:solidFill>
               </a14:hiddenFill>
             </a:ext>
             <a:ext uri="{91240B29-F687-4F45-9708-019B960494DF}">
-              <a14:hiddenLine xmlns="" xmlns:a14="http://schemas.microsoft.com/office/drawing/2010/main" w="9525">
+              <a14:hiddenLine xmlns:a14="http://schemas.microsoft.com/office/drawing/2010/main" xmlns="" w="9525">
                 <a:solidFill>
                   <a:schemeClr val="tx1"/>
                 </a:solidFill>
@@ -8027,7 +7907,7 @@
               </a14:hiddenLine>
             </a:ext>
             <a:ext uri="{AF507438-7753-43E0-B8FC-AC1667EBCBE1}">
-              <a14:hiddenEffects xmlns="" xmlns:a14="http://schemas.microsoft.com/office/drawing/2010/main">
+              <a14:hiddenEffects xmlns:a14="http://schemas.microsoft.com/office/drawing/2010/main" xmlns="">
                 <a:effectLst>
                   <a:outerShdw dist="35921" dir="2700000" algn="ctr" rotWithShape="0">
                     <a:schemeClr val="bg2"/>
@@ -8071,7 +7951,7 @@
     </p:spTree>
     <p:extLst>
       <p:ext uri="{BB962C8B-B14F-4D97-AF65-F5344CB8AC3E}">
-        <p14:creationId xmlns="" xmlns:p14="http://schemas.microsoft.com/office/powerpoint/2010/main" val="3200386711"/>
+        <p14:creationId xmlns:p14="http://schemas.microsoft.com/office/powerpoint/2010/main" xmlns="" val="3200386711"/>
       </p:ext>
     </p:extLst>
   </p:cSld>
@@ -8100,20 +7980,14 @@
       </p:grpSpPr>
       <p:pic>
         <p:nvPicPr>
-          <p:cNvPr id="2" name="Picture 5" descr="E:\2차 프로젝트(구로구 기러기)\04 wire frame\와이어프레임 - 경기일정 게시판(박종수)\경기일정 게시판.PNG"/>
+          <p:cNvPr id="6146" name="Picture 2" descr="C:\Users\hong\Desktop\mediQ\ggs\doc\1.개인폴더\최현우\99. 참고\수정본\경기 일정 조회 수정본.PNG"/>
           <p:cNvPicPr>
             <a:picLocks noChangeAspect="1" noChangeArrowheads="1"/>
           </p:cNvPicPr>
           <p:nvPr/>
         </p:nvPicPr>
         <p:blipFill>
-          <a:blip r:embed="rId2">
-            <a:extLst>
-              <a:ext uri="{28A0092B-C50C-407E-A947-70E740481C1C}">
-                <a14:useLocalDpi xmlns="" xmlns:a14="http://schemas.microsoft.com/office/drawing/2010/main" val="0"/>
-              </a:ext>
-            </a:extLst>
-          </a:blip>
+          <a:blip r:embed="rId2" cstate="print"/>
           <a:srcRect/>
           <a:stretch>
             <a:fillRect/>
@@ -8121,167 +7995,19 @@
         </p:blipFill>
         <p:spPr bwMode="auto">
           <a:xfrm>
-            <a:off x="84982" y="533786"/>
-            <a:ext cx="9000000" cy="6324214"/>
+            <a:off x="683567" y="548680"/>
+            <a:ext cx="7560841" cy="5873080"/>
           </a:xfrm>
           <a:prstGeom prst="rect">
             <a:avLst/>
           </a:prstGeom>
           <a:noFill/>
-          <a:extLst>
-            <a:ext uri="{909E8E84-426E-40DD-AFC4-6F175D3DCCD1}">
-              <a14:hiddenFill xmlns="" xmlns:a14="http://schemas.microsoft.com/office/drawing/2010/main">
-                <a:solidFill>
-                  <a:srgbClr val="FFFFFF"/>
-                </a:solidFill>
-              </a14:hiddenFill>
-            </a:ext>
-          </a:extLst>
         </p:spPr>
       </p:pic>
-      <p:sp>
-        <p:nvSpPr>
-          <p:cNvPr id="4" name="TextBox 3"/>
-          <p:cNvSpPr txBox="1"/>
-          <p:nvPr/>
-        </p:nvSpPr>
-        <p:spPr>
-          <a:xfrm>
-            <a:off x="5652120" y="2462699"/>
-            <a:ext cx="2448272" cy="246221"/>
-          </a:xfrm>
-          <a:prstGeom prst="rect">
-            <a:avLst/>
-          </a:prstGeom>
-          <a:solidFill>
-            <a:schemeClr val="bg1"/>
-          </a:solidFill>
-          <a:ln>
-            <a:solidFill>
-              <a:schemeClr val="tx1"/>
-            </a:solidFill>
-          </a:ln>
-        </p:spPr>
-        <p:txBody>
-          <a:bodyPr wrap="square" rtlCol="0">
-            <a:spAutoFit/>
-          </a:bodyPr>
-          <a:lstStyle/>
-          <a:p>
-            <a:r>
-              <a:rPr lang="ko-KR" altLang="en-US" sz="1000" b="1" dirty="0" err="1" smtClean="0">
-                <a:solidFill>
-                  <a:srgbClr val="FF0000"/>
-                </a:solidFill>
-              </a:rPr>
-              <a:t>페이징</a:t>
-            </a:r>
-            <a:r>
-              <a:rPr lang="ko-KR" altLang="en-US" sz="1000" b="1" dirty="0" smtClean="0">
-                <a:solidFill>
-                  <a:srgbClr val="FF0000"/>
-                </a:solidFill>
-              </a:rPr>
-              <a:t> 처리를 </a:t>
-            </a:r>
-            <a:r>
-              <a:rPr lang="ko-KR" altLang="en-US" sz="1000" b="1" dirty="0" err="1" smtClean="0">
-                <a:solidFill>
-                  <a:srgbClr val="FF0000"/>
-                </a:solidFill>
-              </a:rPr>
-              <a:t>월기준으로</a:t>
-            </a:r>
-            <a:endParaRPr lang="ko-KR" altLang="en-US" sz="1000" b="1" dirty="0">
-              <a:solidFill>
-                <a:srgbClr val="FF0000"/>
-              </a:solidFill>
-            </a:endParaRPr>
-          </a:p>
-        </p:txBody>
-      </p:sp>
-      <p:sp>
-        <p:nvSpPr>
-          <p:cNvPr id="6" name="TextBox 5"/>
-          <p:cNvSpPr txBox="1"/>
-          <p:nvPr/>
-        </p:nvSpPr>
-        <p:spPr>
-          <a:xfrm>
-            <a:off x="3059832" y="1268760"/>
-            <a:ext cx="3384376" cy="246221"/>
-          </a:xfrm>
-          <a:prstGeom prst="rect">
-            <a:avLst/>
-          </a:prstGeom>
-          <a:solidFill>
-            <a:schemeClr val="bg1"/>
-          </a:solidFill>
-          <a:ln>
-            <a:solidFill>
-              <a:schemeClr val="tx1"/>
-            </a:solidFill>
-          </a:ln>
-        </p:spPr>
-        <p:txBody>
-          <a:bodyPr wrap="square" rtlCol="0">
-            <a:spAutoFit/>
-          </a:bodyPr>
-          <a:lstStyle/>
-          <a:p>
-            <a:r>
-              <a:rPr lang="en-US" altLang="ko-KR" sz="1000" b="1" dirty="0" smtClean="0">
-                <a:solidFill>
-                  <a:srgbClr val="FF0000"/>
-                </a:solidFill>
-                <a:sym typeface="Wingdings" pitchFamily="2" charset="2"/>
-              </a:rPr>
-              <a:t> </a:t>
-            </a:r>
-            <a:r>
-              <a:rPr lang="en-US" altLang="ko-KR" sz="1000" b="1" dirty="0" smtClean="0">
-                <a:solidFill>
-                  <a:srgbClr val="FF0000"/>
-                </a:solidFill>
-              </a:rPr>
-              <a:t>4. </a:t>
-            </a:r>
-            <a:r>
-              <a:rPr lang="ko-KR" altLang="en-US" sz="1000" b="1" dirty="0" smtClean="0">
-                <a:solidFill>
-                  <a:srgbClr val="FF0000"/>
-                </a:solidFill>
-              </a:rPr>
-              <a:t>이동 버튼은 </a:t>
-            </a:r>
-            <a:r>
-              <a:rPr lang="en-US" altLang="ko-KR" sz="1000" b="1" dirty="0" smtClean="0">
-                <a:solidFill>
-                  <a:srgbClr val="FF0000"/>
-                </a:solidFill>
-              </a:rPr>
-              <a:t>3</a:t>
-            </a:r>
-            <a:r>
-              <a:rPr lang="ko-KR" altLang="en-US" sz="1000" b="1" dirty="0" smtClean="0">
-                <a:solidFill>
-                  <a:srgbClr val="FF0000"/>
-                </a:solidFill>
-              </a:rPr>
-              <a:t>개로 계속 유지 되도록 변경 검토</a:t>
-            </a:r>
-            <a:endParaRPr lang="ko-KR" altLang="en-US" sz="1000" b="1" dirty="0">
-              <a:solidFill>
-                <a:srgbClr val="FF0000"/>
-              </a:solidFill>
-            </a:endParaRPr>
-          </a:p>
-        </p:txBody>
-      </p:sp>
     </p:spTree>
     <p:extLst>
       <p:ext uri="{BB962C8B-B14F-4D97-AF65-F5344CB8AC3E}">
-        <p14:creationId xmlns="" xmlns:p14="http://schemas.microsoft.com/office/powerpoint/2010/main" val="1522577095"/>
+        <p14:creationId xmlns:p14="http://schemas.microsoft.com/office/powerpoint/2010/main" xmlns="" val="1522577095"/>
       </p:ext>
     </p:extLst>
   </p:cSld>

</xml_diff>